<commit_message>
add tasks at the end
</commit_message>
<xml_diff>
--- a/Databricks & Deltalake.pptx
+++ b/Databricks & Deltalake.pptx
@@ -17,17 +17,19 @@
     <p:sldId id="272" r:id="rId11"/>
     <p:sldId id="267" r:id="rId12"/>
     <p:sldId id="264" r:id="rId13"/>
-    <p:sldId id="266" r:id="rId14"/>
-    <p:sldId id="275" r:id="rId15"/>
-    <p:sldId id="274" r:id="rId16"/>
-    <p:sldId id="268" r:id="rId17"/>
-    <p:sldId id="269" r:id="rId18"/>
-    <p:sldId id="270" r:id="rId19"/>
-    <p:sldId id="273" r:id="rId20"/>
-    <p:sldId id="271" r:id="rId21"/>
-    <p:sldId id="283" r:id="rId22"/>
-    <p:sldId id="278" r:id="rId23"/>
-    <p:sldId id="279" r:id="rId24"/>
+    <p:sldId id="284" r:id="rId14"/>
+    <p:sldId id="266" r:id="rId15"/>
+    <p:sldId id="275" r:id="rId16"/>
+    <p:sldId id="274" r:id="rId17"/>
+    <p:sldId id="268" r:id="rId18"/>
+    <p:sldId id="269" r:id="rId19"/>
+    <p:sldId id="270" r:id="rId20"/>
+    <p:sldId id="273" r:id="rId21"/>
+    <p:sldId id="271" r:id="rId22"/>
+    <p:sldId id="283" r:id="rId23"/>
+    <p:sldId id="278" r:id="rId24"/>
+    <p:sldId id="279" r:id="rId25"/>
+    <p:sldId id="285" r:id="rId26"/>
   </p:sldIdLst>
   <p:sldSz cx="12192000" cy="6858000"/>
   <p:notesSz cx="6858000" cy="9144000"/>
@@ -319,7 +321,7 @@
           <a:p>
             <a:fld id="{88D38747-4367-4BD2-8D51-C97E202738E2}" type="datetime1">
               <a:rPr lang="en-US" smtClean="0"/>
-              <a:t>2021-10-25</a:t>
+              <a:t>2021-10-26</a:t>
             </a:fld>
             <a:endParaRPr lang="en-US" dirty="0"/>
           </a:p>
@@ -624,7 +626,7 @@
           <a:p>
             <a:fld id="{11F1B079-7EF0-44EE-B798-BCC497C9F3B2}" type="datetime1">
               <a:rPr lang="en-US" smtClean="0"/>
-              <a:t>2021-10-25</a:t>
+              <a:t>2021-10-26</a:t>
             </a:fld>
             <a:endParaRPr lang="en-US" dirty="0"/>
           </a:p>
@@ -818,7 +820,7 @@
           <a:p>
             <a:fld id="{28FF70A8-1D13-4657-95F0-A9EA54967B8D}" type="datetime1">
               <a:rPr lang="en-US" smtClean="0"/>
-              <a:t>2021-10-25</a:t>
+              <a:t>2021-10-26</a:t>
             </a:fld>
             <a:endParaRPr lang="en-US" dirty="0"/>
           </a:p>
@@ -1081,7 +1083,7 @@
           <a:p>
             <a:fld id="{21EB90AC-71BD-4C7F-8ACA-7B3F18292E63}" type="datetime1">
               <a:rPr lang="en-US" smtClean="0"/>
-              <a:t>2021-10-25</a:t>
+              <a:t>2021-10-26</a:t>
             </a:fld>
             <a:endParaRPr lang="en-US" dirty="0"/>
           </a:p>
@@ -1517,7 +1519,7 @@
           <a:p>
             <a:fld id="{4E6EFC2C-8905-46F0-B443-CE905B76BA01}" type="datetime1">
               <a:rPr lang="en-US" smtClean="0"/>
-              <a:t>2021-10-25</a:t>
+              <a:t>2021-10-26</a:t>
             </a:fld>
             <a:endParaRPr lang="en-US" dirty="0"/>
           </a:p>
@@ -2054,7 +2056,7 @@
           <a:p>
             <a:fld id="{D9079DC3-C9B5-499E-9140-0DC28B7074E2}" type="datetime1">
               <a:rPr lang="en-US" smtClean="0"/>
-              <a:t>2021-10-25</a:t>
+              <a:t>2021-10-26</a:t>
             </a:fld>
             <a:endParaRPr lang="en-US" dirty="0"/>
           </a:p>
@@ -2936,7 +2938,7 @@
           <a:p>
             <a:fld id="{30BB33EA-E472-4D22-9C03-A9C14AA21CED}" type="datetime1">
               <a:rPr lang="en-US" smtClean="0"/>
-              <a:t>2021-10-25</a:t>
+              <a:t>2021-10-26</a:t>
             </a:fld>
             <a:endParaRPr lang="en-US" dirty="0"/>
           </a:p>
@@ -3106,7 +3108,7 @@
           <a:p>
             <a:fld id="{217E833E-1B6D-415F-AD29-75AE8C43BD0D}" type="datetime1">
               <a:rPr lang="en-US" smtClean="0"/>
-              <a:t>2021-10-25</a:t>
+              <a:t>2021-10-26</a:t>
             </a:fld>
             <a:endParaRPr lang="en-US" dirty="0"/>
           </a:p>
@@ -3290,7 +3292,7 @@
           <a:p>
             <a:fld id="{8452596F-08A7-4B70-989A-F2B1CF31E66B}" type="datetime1">
               <a:rPr lang="en-US" smtClean="0"/>
-              <a:t>2021-10-25</a:t>
+              <a:t>2021-10-26</a:t>
             </a:fld>
             <a:endParaRPr lang="en-US" dirty="0"/>
           </a:p>
@@ -3460,7 +3462,7 @@
           <a:p>
             <a:fld id="{73C55A3C-5767-4844-A0A3-83778C2E5409}" type="datetime1">
               <a:rPr lang="en-US" smtClean="0"/>
-              <a:t>2021-10-25</a:t>
+              <a:t>2021-10-26</a:t>
             </a:fld>
             <a:endParaRPr lang="en-US" dirty="0"/>
           </a:p>
@@ -3704,7 +3706,7 @@
           <a:p>
             <a:fld id="{CAE507A8-A5CF-4D38-AB86-7EDDA87A85D4}" type="datetime1">
               <a:rPr lang="en-US" smtClean="0"/>
-              <a:t>2021-10-25</a:t>
+              <a:t>2021-10-26</a:t>
             </a:fld>
             <a:endParaRPr lang="en-US" dirty="0"/>
           </a:p>
@@ -3946,7 +3948,7 @@
           <a:p>
             <a:fld id="{BDFCD27C-8599-43EF-BA1D-14DDC1946E06}" type="datetime1">
               <a:rPr lang="en-US" smtClean="0"/>
-              <a:t>2021-10-25</a:t>
+              <a:t>2021-10-26</a:t>
             </a:fld>
             <a:endParaRPr lang="en-US" dirty="0"/>
           </a:p>
@@ -4429,7 +4431,7 @@
           <a:p>
             <a:fld id="{49343D99-809A-49C0-96E5-4250D0B498EE}" type="datetime1">
               <a:rPr lang="en-US" smtClean="0"/>
-              <a:t>2021-10-25</a:t>
+              <a:t>2021-10-26</a:t>
             </a:fld>
             <a:endParaRPr lang="en-US" dirty="0"/>
           </a:p>
@@ -4547,7 +4549,7 @@
           <a:p>
             <a:fld id="{A143DE9B-B678-4EFB-BB7D-A4370204A0B0}" type="datetime1">
               <a:rPr lang="en-US" smtClean="0"/>
-              <a:t>2021-10-25</a:t>
+              <a:t>2021-10-26</a:t>
             </a:fld>
             <a:endParaRPr lang="en-US" dirty="0"/>
           </a:p>
@@ -4642,7 +4644,7 @@
           <a:p>
             <a:fld id="{E68812DA-F765-4142-A6A3-A8ED7235E082}" type="datetime1">
               <a:rPr lang="en-US" smtClean="0"/>
-              <a:t>2021-10-25</a:t>
+              <a:t>2021-10-26</a:t>
             </a:fld>
             <a:endParaRPr lang="en-US" dirty="0"/>
           </a:p>
@@ -4897,7 +4899,7 @@
           <a:p>
             <a:fld id="{3E0277FD-7DE6-41D4-930D-AC99F5AFE54E}" type="datetime1">
               <a:rPr lang="en-US" smtClean="0"/>
-              <a:t>2021-10-25</a:t>
+              <a:t>2021-10-26</a:t>
             </a:fld>
             <a:endParaRPr lang="en-US" dirty="0"/>
           </a:p>
@@ -5204,7 +5206,7 @@
           <a:p>
             <a:fld id="{9EA15526-7079-4B7B-987C-1B5FAE11A0FF}" type="datetime1">
               <a:rPr lang="en-US" smtClean="0"/>
-              <a:t>2021-10-25</a:t>
+              <a:t>2021-10-26</a:t>
             </a:fld>
             <a:endParaRPr lang="en-US" dirty="0"/>
           </a:p>
@@ -5439,7 +5441,7 @@
           <a:p>
             <a:fld id="{073ED0CC-082F-4160-86E5-0D6041F12778}" type="datetime1">
               <a:rPr lang="en-US" smtClean="0"/>
-              <a:t>2021-10-25</a:t>
+              <a:t>2021-10-26</a:t>
             </a:fld>
             <a:endParaRPr lang="en-US" dirty="0"/>
           </a:p>
@@ -6299,17 +6301,22 @@
         <p:spPr>
           <a:xfrm>
             <a:off x="913795" y="2076450"/>
-            <a:ext cx="9559133" cy="3622671"/>
-          </a:xfrm>
-        </p:spPr>
-        <p:txBody>
-          <a:bodyPr/>
-          <a:lstStyle/>
-          <a:p>
-            <a:r>
-              <a:rPr lang="en-US" dirty="0"/>
-              <a:t>A company providing a </a:t>
-            </a:r>
+            <a:ext cx="9559133" cy="4715608"/>
+          </a:xfrm>
+        </p:spPr>
+        <p:txBody>
+          <a:bodyPr>
+            <a:normAutofit/>
+          </a:bodyPr>
+          <a:lstStyle/>
+          <a:p>
+            <a:r>
+              <a:rPr lang="en-US" dirty="0"/>
+              <a:t>A company providing a platform</a:t>
+            </a:r>
+          </a:p>
+          <a:p>
+            <a:endParaRPr lang="en-US" dirty="0"/>
           </a:p>
           <a:p>
             <a:r>
@@ -6344,6 +6351,9 @@
               <a:rPr lang="en-US" dirty="0"/>
               <a:t>Analytics</a:t>
             </a:r>
+          </a:p>
+          <a:p>
+            <a:endParaRPr lang="en-US" dirty="0"/>
           </a:p>
           <a:p>
             <a:r>
@@ -6759,38 +6769,59 @@
             <p:ph idx="1"/>
           </p:nvPr>
         </p:nvSpPr>
-        <p:spPr/>
+        <p:spPr>
+          <a:xfrm>
+            <a:off x="913795" y="2076450"/>
+            <a:ext cx="10353762" cy="4781550"/>
+          </a:xfrm>
+        </p:spPr>
         <p:txBody>
           <a:bodyPr/>
           <a:lstStyle/>
           <a:p>
             <a:r>
               <a:rPr lang="en-US" dirty="0"/>
+              <a:t>Cluster: set of computation resources</a:t>
+            </a:r>
+          </a:p>
+          <a:p>
+            <a:pPr lvl="1"/>
+            <a:r>
+              <a:rPr lang="en-US" dirty="0"/>
               <a:t>Distributed processing!!!</a:t>
             </a:r>
           </a:p>
           <a:p>
+            <a:pPr lvl="1"/>
+            <a:endParaRPr lang="en-US" dirty="0"/>
+          </a:p>
+          <a:p>
             <a:r>
               <a:rPr lang="en-US" dirty="0"/>
               <a:t>Notebooks must run on a cluster</a:t>
             </a:r>
           </a:p>
           <a:p>
+            <a:endParaRPr lang="en-US" dirty="0"/>
+          </a:p>
+          <a:p>
             <a:r>
               <a:rPr lang="en-US" dirty="0"/>
               <a:t>All purpose vs Jobs</a:t>
             </a:r>
           </a:p>
           <a:p>
-            <a:r>
-              <a:rPr lang="en-US" dirty="0"/>
-              <a:t>All purpose lives for X amount then slumbers</a:t>
-            </a:r>
-          </a:p>
-          <a:p>
-            <a:r>
-              <a:rPr lang="en-US" dirty="0"/>
-              <a:t>Jobs run </a:t>
+            <a:pPr lvl="1"/>
+            <a:r>
+              <a:rPr lang="en-US" dirty="0"/>
+              <a:t>All purpose: lives for X amount then slumbers</a:t>
+            </a:r>
+          </a:p>
+          <a:p>
+            <a:pPr lvl="1"/>
+            <a:r>
+              <a:rPr lang="en-US" dirty="0"/>
+              <a:t>Jobs: runs </a:t>
             </a:r>
             <a:r>
               <a:rPr lang="en-US" dirty="0" err="1"/>
@@ -6798,7 +6829,7 @@
             </a:r>
             <a:r>
               <a:rPr lang="en-US" dirty="0"/>
-              <a:t> job is done, then die forever</a:t>
+              <a:t> job is done, then dies forever</a:t>
             </a:r>
           </a:p>
         </p:txBody>
@@ -6838,7 +6869,7 @@
           <p:cNvPr id="2" name="Title 1">
             <a:extLst>
               <a:ext uri="{FF2B5EF4-FFF2-40B4-BE49-F238E27FC236}">
-                <a16:creationId xmlns:a16="http://schemas.microsoft.com/office/drawing/2014/main" id="{E7079AA2-86BC-4121-BE22-452994654535}"/>
+                <a16:creationId xmlns:a16="http://schemas.microsoft.com/office/drawing/2014/main" id="{FDF61D55-A9A2-4CD7-A4E9-EEBFA0161D09}"/>
               </a:ext>
             </a:extLst>
           </p:cNvPr>
@@ -6856,87 +6887,78 @@
           <a:p>
             <a:r>
               <a:rPr lang="en-US" dirty="0"/>
-              <a:t>The </a:t>
+              <a:t>Pools</a:t>
+            </a:r>
+          </a:p>
+        </p:txBody>
+      </p:sp>
+      <p:sp>
+        <p:nvSpPr>
+          <p:cNvPr id="3" name="Content Placeholder 2">
+            <a:extLst>
+              <a:ext uri="{FF2B5EF4-FFF2-40B4-BE49-F238E27FC236}">
+                <a16:creationId xmlns:a16="http://schemas.microsoft.com/office/drawing/2014/main" id="{EEB40085-0B23-4D29-B115-2A67C377F6CD}"/>
+              </a:ext>
+            </a:extLst>
+          </p:cNvPr>
+          <p:cNvSpPr>
+            <a:spLocks noGrp="1"/>
+          </p:cNvSpPr>
+          <p:nvPr>
+            <p:ph idx="1"/>
+          </p:nvPr>
+        </p:nvSpPr>
+        <p:spPr>
+          <a:xfrm>
+            <a:off x="913795" y="2076450"/>
+            <a:ext cx="10353762" cy="4012223"/>
+          </a:xfrm>
+        </p:spPr>
+        <p:txBody>
+          <a:bodyPr/>
+          <a:lstStyle/>
+          <a:p>
+            <a:r>
+              <a:rPr lang="en-US" dirty="0"/>
+              <a:t>By maintaining a set of </a:t>
             </a:r>
             <a:r>
               <a:rPr lang="en-US" dirty="0" err="1"/>
-              <a:t>Dataframe</a:t>
-            </a:r>
+              <a:t>idle,ready</a:t>
+            </a:r>
+            <a:r>
+              <a:rPr lang="en-US" dirty="0"/>
+              <a:t>-to-use instances</a:t>
+            </a:r>
+          </a:p>
+          <a:p>
+            <a:pPr lvl="1"/>
+            <a:r>
+              <a:rPr lang="en-US" dirty="0"/>
+              <a:t>reduce cluster start </a:t>
+            </a:r>
+          </a:p>
+          <a:p>
+            <a:pPr lvl="1"/>
+            <a:r>
+              <a:rPr lang="en-US" dirty="0"/>
+              <a:t>Reduce auto-scaling times</a:t>
+            </a:r>
+          </a:p>
+          <a:p>
+            <a:pPr lvl="1"/>
             <a:endParaRPr lang="en-US" dirty="0"/>
           </a:p>
-        </p:txBody>
-      </p:sp>
-      <p:sp>
-        <p:nvSpPr>
-          <p:cNvPr id="3" name="Content Placeholder 2">
-            <a:extLst>
-              <a:ext uri="{FF2B5EF4-FFF2-40B4-BE49-F238E27FC236}">
-                <a16:creationId xmlns:a16="http://schemas.microsoft.com/office/drawing/2014/main" id="{58CC6E8B-B190-453D-9904-F9F45490B5E0}"/>
-              </a:ext>
-            </a:extLst>
-          </p:cNvPr>
-          <p:cNvSpPr>
-            <a:spLocks noGrp="1"/>
-          </p:cNvSpPr>
-          <p:nvPr>
-            <p:ph idx="1"/>
-          </p:nvPr>
-        </p:nvSpPr>
-        <p:spPr/>
-        <p:txBody>
-          <a:bodyPr/>
-          <a:lstStyle/>
-          <a:p>
-            <a:r>
-              <a:rPr lang="en-US" dirty="0"/>
-              <a:t>Everything is centered around </a:t>
-            </a:r>
-            <a:r>
-              <a:rPr lang="en-US" dirty="0" err="1"/>
-              <a:t>dataframes</a:t>
-            </a:r>
+          <a:p>
+            <a:pPr marL="450000" lvl="1" indent="0">
+              <a:buNone/>
+            </a:pPr>
             <a:endParaRPr lang="en-US" dirty="0"/>
           </a:p>
           <a:p>
             <a:r>
               <a:rPr lang="en-US" dirty="0"/>
-              <a:t>Provides a rich set of functions (select columns, filter, join, aggregate </a:t>
-            </a:r>
-            <a:r>
-              <a:rPr lang="en-US" dirty="0" err="1"/>
-              <a:t>etc</a:t>
-            </a:r>
-            <a:r>
-              <a:rPr lang="en-US" dirty="0"/>
-              <a:t>)</a:t>
-            </a:r>
-          </a:p>
-          <a:p>
-            <a:r>
-              <a:rPr lang="en-US" dirty="0"/>
-              <a:t> the most common Structured API and simply represents a table of data with rows and columns</a:t>
-            </a:r>
-          </a:p>
-          <a:p>
-            <a:r>
-              <a:rPr lang="en-US" dirty="0"/>
-              <a:t>Read into </a:t>
-            </a:r>
-            <a:r>
-              <a:rPr lang="en-US" dirty="0" err="1"/>
-              <a:t>dataframe</a:t>
-            </a:r>
-            <a:r>
-              <a:rPr lang="en-US" dirty="0"/>
-              <a:t>, write </a:t>
-            </a:r>
-            <a:r>
-              <a:rPr lang="en-US" dirty="0" err="1"/>
-              <a:t>dataframe</a:t>
-            </a:r>
-            <a:r>
-              <a:rPr lang="en-US" dirty="0"/>
-              <a:t> to storage</a:t>
+              <a:t>Manage subscription VM limit?</a:t>
             </a:r>
           </a:p>
         </p:txBody>
@@ -6944,7 +6966,7 @@
     </p:spTree>
     <p:extLst>
       <p:ext uri="{BB962C8B-B14F-4D97-AF65-F5344CB8AC3E}">
-        <p14:creationId xmlns:p14="http://schemas.microsoft.com/office/powerpoint/2010/main" val="4144237118"/>
+        <p14:creationId xmlns:p14="http://schemas.microsoft.com/office/powerpoint/2010/main" val="4291648006"/>
       </p:ext>
     </p:extLst>
   </p:cSld>
@@ -6976,7 +6998,7 @@
           <p:cNvPr id="2" name="Title 1">
             <a:extLst>
               <a:ext uri="{FF2B5EF4-FFF2-40B4-BE49-F238E27FC236}">
-                <a16:creationId xmlns:a16="http://schemas.microsoft.com/office/drawing/2014/main" id="{C42AD6EE-9D77-4959-9152-5C6DE1189AE8}"/>
+                <a16:creationId xmlns:a16="http://schemas.microsoft.com/office/drawing/2014/main" id="{E7079AA2-86BC-4121-BE22-452994654535}"/>
               </a:ext>
             </a:extLst>
           </p:cNvPr>
@@ -6994,8 +7016,13 @@
           <a:p>
             <a:r>
               <a:rPr lang="en-US" dirty="0"/>
-              <a:t>DBFS</a:t>
-            </a:r>
+              <a:t>The </a:t>
+            </a:r>
+            <a:r>
+              <a:rPr lang="en-US" dirty="0" err="1"/>
+              <a:t>Dataframe</a:t>
+            </a:r>
+            <a:endParaRPr lang="en-US" dirty="0"/>
           </a:p>
         </p:txBody>
       </p:sp>
@@ -7004,7 +7031,7 @@
           <p:cNvPr id="3" name="Content Placeholder 2">
             <a:extLst>
               <a:ext uri="{FF2B5EF4-FFF2-40B4-BE49-F238E27FC236}">
-                <a16:creationId xmlns:a16="http://schemas.microsoft.com/office/drawing/2014/main" id="{0A90DB69-56B7-4F94-9DD2-25D40B551626}"/>
+                <a16:creationId xmlns:a16="http://schemas.microsoft.com/office/drawing/2014/main" id="{58CC6E8B-B190-453D-9904-F9F45490B5E0}"/>
               </a:ext>
             </a:extLst>
           </p:cNvPr>
@@ -7022,55 +7049,73 @@
           <a:p>
             <a:r>
               <a:rPr lang="en-US" dirty="0"/>
-              <a:t>Databricks File System</a:t>
-            </a:r>
-          </a:p>
-          <a:p>
-            <a:r>
-              <a:rPr lang="en-US" dirty="0"/>
-              <a:t>A distributed file system mounted into a Databricks workspace</a:t>
-            </a:r>
-          </a:p>
-          <a:p>
-            <a:r>
-              <a:rPr lang="en-US" dirty="0"/>
-              <a:t>An abstraction on top of scalable object storage</a:t>
-            </a:r>
-          </a:p>
-          <a:p>
-            <a:pPr lvl="1"/>
-            <a:r>
-              <a:rPr lang="en-US" dirty="0"/>
-              <a:t>Benefits:</a:t>
-            </a:r>
-          </a:p>
-          <a:p>
-            <a:pPr lvl="2"/>
-            <a:r>
-              <a:rPr lang="en-US" dirty="0"/>
-              <a:t>Mount storage objects -&gt; seamlessly access data without requiring credentials.</a:t>
-            </a:r>
-          </a:p>
-          <a:p>
-            <a:pPr lvl="2"/>
-            <a:r>
-              <a:rPr lang="en-US" dirty="0"/>
-              <a:t>interact with object storage using directory and file semantics instead of storage URLs</a:t>
-            </a:r>
-          </a:p>
-          <a:p>
-            <a:pPr lvl="2"/>
-            <a:r>
-              <a:rPr lang="en-US" dirty="0"/>
-              <a:t>Persists files to object storage, so you won’t lose data after you terminate a cluster.</a:t>
-            </a:r>
+              <a:t>Everything is centered around </a:t>
+            </a:r>
+            <a:r>
+              <a:rPr lang="en-US" dirty="0" err="1"/>
+              <a:t>dataframes</a:t>
+            </a:r>
+            <a:endParaRPr lang="en-US" dirty="0"/>
+          </a:p>
+          <a:p>
+            <a:r>
+              <a:rPr lang="en-US" dirty="0"/>
+              <a:t>Provides a rich set of functions (select columns, filter, join, aggregate </a:t>
+            </a:r>
+            <a:r>
+              <a:rPr lang="en-US" dirty="0" err="1"/>
+              <a:t>etc</a:t>
+            </a:r>
+            <a:r>
+              <a:rPr lang="en-US" dirty="0"/>
+              <a:t>)</a:t>
+            </a:r>
+          </a:p>
+          <a:p>
+            <a:r>
+              <a:rPr lang="en-US" dirty="0"/>
+              <a:t> the most common Structured API and simply represents a table of data with rows and columns</a:t>
+            </a:r>
+          </a:p>
+          <a:p>
+            <a:r>
+              <a:rPr lang="en-US" dirty="0"/>
+              <a:t>Read into </a:t>
+            </a:r>
+            <a:r>
+              <a:rPr lang="en-US" dirty="0" err="1"/>
+              <a:t>dataframe</a:t>
+            </a:r>
+            <a:r>
+              <a:rPr lang="en-US" dirty="0"/>
+              <a:t>, write </a:t>
+            </a:r>
+            <a:r>
+              <a:rPr lang="en-US" dirty="0" err="1"/>
+              <a:t>dataframe</a:t>
+            </a:r>
+            <a:r>
+              <a:rPr lang="en-US" dirty="0"/>
+              <a:t> to storage</a:t>
+            </a:r>
+          </a:p>
+          <a:p>
+            <a:r>
+              <a:rPr lang="en-US" dirty="0"/>
+              <a:t>Working with streaming and batch is just working with a </a:t>
+            </a:r>
+            <a:r>
+              <a:rPr lang="en-US" dirty="0" err="1"/>
+              <a:t>dataframe</a:t>
+            </a:r>
+            <a:endParaRPr lang="en-US" dirty="0"/>
           </a:p>
         </p:txBody>
       </p:sp>
     </p:spTree>
     <p:extLst>
       <p:ext uri="{BB962C8B-B14F-4D97-AF65-F5344CB8AC3E}">
-        <p14:creationId xmlns:p14="http://schemas.microsoft.com/office/powerpoint/2010/main" val="3012287953"/>
+        <p14:creationId xmlns:p14="http://schemas.microsoft.com/office/powerpoint/2010/main" val="4144237118"/>
       </p:ext>
     </p:extLst>
   </p:cSld>
@@ -7102,7 +7147,7 @@
           <p:cNvPr id="2" name="Title 1">
             <a:extLst>
               <a:ext uri="{FF2B5EF4-FFF2-40B4-BE49-F238E27FC236}">
-                <a16:creationId xmlns:a16="http://schemas.microsoft.com/office/drawing/2014/main" id="{DB4AB57E-259A-43D4-99FA-CCC0BA8E7298}"/>
+                <a16:creationId xmlns:a16="http://schemas.microsoft.com/office/drawing/2014/main" id="{C42AD6EE-9D77-4959-9152-5C6DE1189AE8}"/>
               </a:ext>
             </a:extLst>
           </p:cNvPr>
@@ -7110,7 +7155,7 @@
             <a:spLocks noGrp="1"/>
           </p:cNvSpPr>
           <p:nvPr>
-            <p:ph type="ctrTitle"/>
+            <p:ph type="title"/>
           </p:nvPr>
         </p:nvSpPr>
         <p:spPr/>
@@ -7120,17 +7165,17 @@
           <a:p>
             <a:r>
               <a:rPr lang="en-US" dirty="0"/>
-              <a:t>Delta Lake</a:t>
-            </a:r>
-          </a:p>
-        </p:txBody>
-      </p:sp>
-      <p:sp>
-        <p:nvSpPr>
-          <p:cNvPr id="3" name="Subtitle 2">
+              <a:t>DBFS</a:t>
+            </a:r>
+          </a:p>
+        </p:txBody>
+      </p:sp>
+      <p:sp>
+        <p:nvSpPr>
+          <p:cNvPr id="3" name="Content Placeholder 2">
             <a:extLst>
               <a:ext uri="{FF2B5EF4-FFF2-40B4-BE49-F238E27FC236}">
-                <a16:creationId xmlns:a16="http://schemas.microsoft.com/office/drawing/2014/main" id="{24B23C47-02EC-45DA-8FCE-6CB2A68BBDC4}"/>
+                <a16:creationId xmlns:a16="http://schemas.microsoft.com/office/drawing/2014/main" id="{0A90DB69-56B7-4F94-9DD2-25D40B551626}"/>
               </a:ext>
             </a:extLst>
           </p:cNvPr>
@@ -7138,7 +7183,7 @@
             <a:spLocks noGrp="1"/>
           </p:cNvSpPr>
           <p:nvPr>
-            <p:ph type="subTitle" idx="1"/>
+            <p:ph idx="1"/>
           </p:nvPr>
         </p:nvSpPr>
         <p:spPr/>
@@ -7146,14 +7191,57 @@
           <a:bodyPr/>
           <a:lstStyle/>
           <a:p>
-            <a:endParaRPr lang="en-US"/>
+            <a:r>
+              <a:rPr lang="en-US" dirty="0"/>
+              <a:t>Databricks File System</a:t>
+            </a:r>
+          </a:p>
+          <a:p>
+            <a:r>
+              <a:rPr lang="en-US" dirty="0"/>
+              <a:t>A distributed file system mounted into a Databricks workspace</a:t>
+            </a:r>
+          </a:p>
+          <a:p>
+            <a:r>
+              <a:rPr lang="en-US" dirty="0"/>
+              <a:t>An abstraction on top of scalable object storage</a:t>
+            </a:r>
+          </a:p>
+          <a:p>
+            <a:pPr lvl="1"/>
+            <a:r>
+              <a:rPr lang="en-US" dirty="0"/>
+              <a:t>Benefits:</a:t>
+            </a:r>
+          </a:p>
+          <a:p>
+            <a:pPr lvl="2"/>
+            <a:r>
+              <a:rPr lang="en-US" dirty="0"/>
+              <a:t>Mount storage objects -&gt; seamlessly access data without requiring credentials.</a:t>
+            </a:r>
+          </a:p>
+          <a:p>
+            <a:pPr lvl="2"/>
+            <a:r>
+              <a:rPr lang="en-US" dirty="0"/>
+              <a:t>interact with object storage using directory and file semantics instead of storage URLs</a:t>
+            </a:r>
+          </a:p>
+          <a:p>
+            <a:pPr lvl="2"/>
+            <a:r>
+              <a:rPr lang="en-US" dirty="0"/>
+              <a:t>Persists files to object storage, so you won’t lose data after you terminate a cluster.</a:t>
+            </a:r>
           </a:p>
         </p:txBody>
       </p:sp>
     </p:spTree>
     <p:extLst>
       <p:ext uri="{BB962C8B-B14F-4D97-AF65-F5344CB8AC3E}">
-        <p14:creationId xmlns:p14="http://schemas.microsoft.com/office/powerpoint/2010/main" val="3735907562"/>
+        <p14:creationId xmlns:p14="http://schemas.microsoft.com/office/powerpoint/2010/main" val="3012287953"/>
       </p:ext>
     </p:extLst>
   </p:cSld>
@@ -7185,7 +7273,7 @@
           <p:cNvPr id="2" name="Title 1">
             <a:extLst>
               <a:ext uri="{FF2B5EF4-FFF2-40B4-BE49-F238E27FC236}">
-                <a16:creationId xmlns:a16="http://schemas.microsoft.com/office/drawing/2014/main" id="{16707BDB-FDFD-417E-96FC-5B505A26FF97}"/>
+                <a16:creationId xmlns:a16="http://schemas.microsoft.com/office/drawing/2014/main" id="{DB4AB57E-259A-43D4-99FA-CCC0BA8E7298}"/>
               </a:ext>
             </a:extLst>
           </p:cNvPr>
@@ -7193,7 +7281,7 @@
             <a:spLocks noGrp="1"/>
           </p:cNvSpPr>
           <p:nvPr>
-            <p:ph type="title"/>
+            <p:ph type="ctrTitle"/>
           </p:nvPr>
         </p:nvSpPr>
         <p:spPr/>
@@ -7203,17 +7291,17 @@
           <a:p>
             <a:r>
               <a:rPr lang="en-US" dirty="0"/>
-              <a:t>Why is Delta Lake</a:t>
-            </a:r>
-          </a:p>
-        </p:txBody>
-      </p:sp>
-      <p:sp>
-        <p:nvSpPr>
-          <p:cNvPr id="3" name="Content Placeholder 2">
+              <a:t>Delta Lake</a:t>
+            </a:r>
+          </a:p>
+        </p:txBody>
+      </p:sp>
+      <p:sp>
+        <p:nvSpPr>
+          <p:cNvPr id="3" name="Subtitle 2">
             <a:extLst>
               <a:ext uri="{FF2B5EF4-FFF2-40B4-BE49-F238E27FC236}">
-                <a16:creationId xmlns:a16="http://schemas.microsoft.com/office/drawing/2014/main" id="{E7989CD7-2EC1-4F95-8E83-53B4C182353C}"/>
+                <a16:creationId xmlns:a16="http://schemas.microsoft.com/office/drawing/2014/main" id="{24B23C47-02EC-45DA-8FCE-6CB2A68BBDC4}"/>
               </a:ext>
             </a:extLst>
           </p:cNvPr>
@@ -7221,7 +7309,7 @@
             <a:spLocks noGrp="1"/>
           </p:cNvSpPr>
           <p:nvPr>
-            <p:ph idx="1"/>
+            <p:ph type="subTitle" idx="1"/>
           </p:nvPr>
         </p:nvSpPr>
         <p:spPr/>
@@ -7229,36 +7317,14 @@
           <a:bodyPr/>
           <a:lstStyle/>
           <a:p>
-            <a:r>
-              <a:rPr lang="en-US" dirty="0"/>
-              <a:t>Spark writes are not atomic and data consistency is not guaranteed</a:t>
-            </a:r>
-          </a:p>
-          <a:p>
-            <a:r>
-              <a:rPr lang="en-US" dirty="0"/>
-              <a:t>Data lakes often have multiple pipelines reading and writing data concurrently</a:t>
-            </a:r>
-          </a:p>
-          <a:p>
-            <a:pPr lvl="1"/>
-            <a:r>
-              <a:rPr lang="en-US" dirty="0"/>
-              <a:t>Hard to ensure data integrity, due to the lack of transactions</a:t>
-            </a:r>
-          </a:p>
-          <a:p>
-            <a:r>
-              <a:rPr lang="en-US" dirty="0"/>
-              <a:t>When metadata itself becomes big data, it is difficult to manage data</a:t>
-            </a:r>
+            <a:endParaRPr lang="en-US"/>
           </a:p>
         </p:txBody>
       </p:sp>
     </p:spTree>
     <p:extLst>
       <p:ext uri="{BB962C8B-B14F-4D97-AF65-F5344CB8AC3E}">
-        <p14:creationId xmlns:p14="http://schemas.microsoft.com/office/powerpoint/2010/main" val="3601017232"/>
+        <p14:creationId xmlns:p14="http://schemas.microsoft.com/office/powerpoint/2010/main" val="3735907562"/>
       </p:ext>
     </p:extLst>
   </p:cSld>
@@ -7290,7 +7356,7 @@
           <p:cNvPr id="2" name="Title 1">
             <a:extLst>
               <a:ext uri="{FF2B5EF4-FFF2-40B4-BE49-F238E27FC236}">
-                <a16:creationId xmlns:a16="http://schemas.microsoft.com/office/drawing/2014/main" id="{60DC03D7-1F0C-4879-BA3C-47FC224DADD6}"/>
+                <a16:creationId xmlns:a16="http://schemas.microsoft.com/office/drawing/2014/main" id="{16707BDB-FDFD-417E-96FC-5B505A26FF97}"/>
               </a:ext>
             </a:extLst>
           </p:cNvPr>
@@ -7308,7 +7374,7 @@
           <a:p>
             <a:r>
               <a:rPr lang="en-US" dirty="0"/>
-              <a:t>What is Delta lake?</a:t>
+              <a:t>Why is Delta Lake</a:t>
             </a:r>
           </a:p>
         </p:txBody>
@@ -7318,7 +7384,7 @@
           <p:cNvPr id="3" name="Content Placeholder 2">
             <a:extLst>
               <a:ext uri="{FF2B5EF4-FFF2-40B4-BE49-F238E27FC236}">
-                <a16:creationId xmlns:a16="http://schemas.microsoft.com/office/drawing/2014/main" id="{23FD3371-D6C1-4874-A7C0-E125D30E34B1}"/>
+                <a16:creationId xmlns:a16="http://schemas.microsoft.com/office/drawing/2014/main" id="{E7989CD7-2EC1-4F95-8E83-53B4C182353C}"/>
               </a:ext>
             </a:extLst>
           </p:cNvPr>
@@ -7336,40 +7402,32 @@
           <a:p>
             <a:r>
               <a:rPr lang="en-US" dirty="0"/>
-              <a:t>Delta Lake is a project that was developed by Databricks and now open sourced</a:t>
-            </a:r>
-          </a:p>
-          <a:p>
-            <a:r>
-              <a:rPr lang="en-US" dirty="0"/>
-              <a:t>Storage layer that sits on top of the Apache Spark services which brings reliability to data lakes</a:t>
-            </a:r>
-          </a:p>
-          <a:p>
-            <a:r>
-              <a:rPr lang="en-US" dirty="0"/>
-              <a:t>Core features: </a:t>
+              <a:t>Spark writes are not atomic and data consistency is not guaranteed</a:t>
+            </a:r>
+          </a:p>
+          <a:p>
+            <a:endParaRPr lang="en-US" dirty="0"/>
+          </a:p>
+          <a:p>
+            <a:r>
+              <a:rPr lang="en-US" dirty="0"/>
+              <a:t>Data lakes often have multiple pipelines reading and writing data concurrently</a:t>
             </a:r>
           </a:p>
           <a:p>
             <a:pPr lvl="1"/>
             <a:r>
               <a:rPr lang="en-US" dirty="0"/>
-              <a:t>ACID transactions (atomicity, consistency, isolation, durability)</a:t>
-            </a:r>
-          </a:p>
-          <a:p>
-            <a:pPr lvl="1"/>
-            <a:r>
-              <a:rPr lang="en-US" dirty="0"/>
-              <a:t>scalable metadata handling</a:t>
-            </a:r>
-          </a:p>
-          <a:p>
-            <a:pPr lvl="1"/>
-            <a:r>
-              <a:rPr lang="en-US" dirty="0"/>
-              <a:t>unifies streaming and batch data processing</a:t>
+              <a:t>Hard to ensure data integrity, due to the lack of transactions</a:t>
+            </a:r>
+          </a:p>
+          <a:p>
+            <a:endParaRPr lang="en-US" dirty="0"/>
+          </a:p>
+          <a:p>
+            <a:r>
+              <a:rPr lang="en-US" dirty="0"/>
+              <a:t>When metadata itself becomes big data, it is difficult to manage data</a:t>
             </a:r>
           </a:p>
         </p:txBody>
@@ -7377,7 +7435,7 @@
     </p:spTree>
     <p:extLst>
       <p:ext uri="{BB962C8B-B14F-4D97-AF65-F5344CB8AC3E}">
-        <p14:creationId xmlns:p14="http://schemas.microsoft.com/office/powerpoint/2010/main" val="2540514463"/>
+        <p14:creationId xmlns:p14="http://schemas.microsoft.com/office/powerpoint/2010/main" val="3601017232"/>
       </p:ext>
     </p:extLst>
   </p:cSld>
@@ -7409,7 +7467,7 @@
           <p:cNvPr id="2" name="Title 1">
             <a:extLst>
               <a:ext uri="{FF2B5EF4-FFF2-40B4-BE49-F238E27FC236}">
-                <a16:creationId xmlns:a16="http://schemas.microsoft.com/office/drawing/2014/main" id="{410E76AF-0896-4C63-9164-27D76220A6E2}"/>
+                <a16:creationId xmlns:a16="http://schemas.microsoft.com/office/drawing/2014/main" id="{60DC03D7-1F0C-4879-BA3C-47FC224DADD6}"/>
               </a:ext>
             </a:extLst>
           </p:cNvPr>
@@ -7427,7 +7485,7 @@
           <a:p>
             <a:r>
               <a:rPr lang="en-US" dirty="0"/>
-              <a:t>How does it work?</a:t>
+              <a:t>What is Delta lake?</a:t>
             </a:r>
           </a:p>
         </p:txBody>
@@ -7437,7 +7495,7 @@
           <p:cNvPr id="3" name="Content Placeholder 2">
             <a:extLst>
               <a:ext uri="{FF2B5EF4-FFF2-40B4-BE49-F238E27FC236}">
-                <a16:creationId xmlns:a16="http://schemas.microsoft.com/office/drawing/2014/main" id="{0F2982E5-FA2A-4DF8-B7AD-8DB34CE4A43B}"/>
+                <a16:creationId xmlns:a16="http://schemas.microsoft.com/office/drawing/2014/main" id="{23FD3371-D6C1-4874-A7C0-E125D30E34B1}"/>
               </a:ext>
             </a:extLst>
           </p:cNvPr>
@@ -7455,13 +7513,40 @@
           <a:p>
             <a:r>
               <a:rPr lang="en-US" dirty="0"/>
-              <a:t>Delta lake provides a storage layer on top of existing cloud storage data lake</a:t>
-            </a:r>
-          </a:p>
-          <a:p>
-            <a:r>
-              <a:rPr lang="en-US" dirty="0"/>
-              <a:t>Acts as a middle layer between Spark runtime and cloud storage</a:t>
+              <a:t>Delta Lake is a project that was developed by Databricks and now open sourced</a:t>
+            </a:r>
+          </a:p>
+          <a:p>
+            <a:r>
+              <a:rPr lang="en-US" dirty="0"/>
+              <a:t>Storage layer that sits on top of the Apache Spark services which brings reliability to data lakes</a:t>
+            </a:r>
+          </a:p>
+          <a:p>
+            <a:r>
+              <a:rPr lang="en-US" dirty="0"/>
+              <a:t>Core features: </a:t>
+            </a:r>
+          </a:p>
+          <a:p>
+            <a:pPr lvl="1"/>
+            <a:r>
+              <a:rPr lang="en-US" dirty="0"/>
+              <a:t>ACID transactions (atomicity, consistency, isolation, durability)</a:t>
+            </a:r>
+          </a:p>
+          <a:p>
+            <a:pPr lvl="1"/>
+            <a:r>
+              <a:rPr lang="en-US" dirty="0"/>
+              <a:t>scalable metadata handling</a:t>
+            </a:r>
+          </a:p>
+          <a:p>
+            <a:pPr lvl="1"/>
+            <a:r>
+              <a:rPr lang="en-US" dirty="0"/>
+              <a:t>unifies streaming and batch data processing</a:t>
             </a:r>
           </a:p>
         </p:txBody>
@@ -7469,7 +7554,7 @@
     </p:spTree>
     <p:extLst>
       <p:ext uri="{BB962C8B-B14F-4D97-AF65-F5344CB8AC3E}">
-        <p14:creationId xmlns:p14="http://schemas.microsoft.com/office/powerpoint/2010/main" val="2250654023"/>
+        <p14:creationId xmlns:p14="http://schemas.microsoft.com/office/powerpoint/2010/main" val="2540514463"/>
       </p:ext>
     </p:extLst>
   </p:cSld>
@@ -7501,7 +7586,7 @@
           <p:cNvPr id="2" name="Title 1">
             <a:extLst>
               <a:ext uri="{FF2B5EF4-FFF2-40B4-BE49-F238E27FC236}">
-                <a16:creationId xmlns:a16="http://schemas.microsoft.com/office/drawing/2014/main" id="{7C9DCB3F-F6DA-4EDE-817D-87E7D2C208A7}"/>
+                <a16:creationId xmlns:a16="http://schemas.microsoft.com/office/drawing/2014/main" id="{410E76AF-0896-4C63-9164-27D76220A6E2}"/>
               </a:ext>
             </a:extLst>
           </p:cNvPr>
@@ -7519,7 +7604,7 @@
           <a:p>
             <a:r>
               <a:rPr lang="en-US" dirty="0"/>
-              <a:t>Apache Parquet Files</a:t>
+              <a:t>How does it work?</a:t>
             </a:r>
           </a:p>
         </p:txBody>
@@ -7529,7 +7614,7 @@
           <p:cNvPr id="3" name="Content Placeholder 2">
             <a:extLst>
               <a:ext uri="{FF2B5EF4-FFF2-40B4-BE49-F238E27FC236}">
-                <a16:creationId xmlns:a16="http://schemas.microsoft.com/office/drawing/2014/main" id="{F805BB87-94E0-436B-A872-466AA062ECC5}"/>
+                <a16:creationId xmlns:a16="http://schemas.microsoft.com/office/drawing/2014/main" id="{0F2982E5-FA2A-4DF8-B7AD-8DB34CE4A43B}"/>
               </a:ext>
             </a:extLst>
           </p:cNvPr>
@@ -7547,137 +7632,24 @@
           <a:p>
             <a:r>
               <a:rPr lang="en-US" dirty="0"/>
-              <a:t>Columnar storage</a:t>
-            </a:r>
-          </a:p>
-          <a:p>
-            <a:pPr lvl="1"/>
-            <a:r>
-              <a:rPr lang="en-US" dirty="0"/>
-              <a:t>As apposed to row-based files like CSV or Avro</a:t>
-            </a:r>
-          </a:p>
-          <a:p>
-            <a:r>
-              <a:rPr lang="en-US" dirty="0"/>
-              <a:t>Metadata including schema and structure is embedded within each file</a:t>
-            </a:r>
-          </a:p>
-          <a:p>
-            <a:r>
-              <a:rPr lang="en-US" dirty="0"/>
-              <a:t>Can store nested data</a:t>
-            </a:r>
-          </a:p>
-          <a:p>
-            <a:r>
-              <a:rPr lang="en-US" dirty="0"/>
-              <a:t>Optimized for queries that process large volumes of data (Gb range)</a:t>
+              <a:t>Delta lake provides a storage layer on top of existing cloud storage data lake</a:t>
             </a:r>
           </a:p>
           <a:p>
             <a:endParaRPr lang="en-US" dirty="0"/>
           </a:p>
-        </p:txBody>
-      </p:sp>
-      <p:pic>
-        <p:nvPicPr>
-          <p:cNvPr id="1026" name="Picture 2">
-            <a:extLst>
-              <a:ext uri="{FF2B5EF4-FFF2-40B4-BE49-F238E27FC236}">
-                <a16:creationId xmlns:a16="http://schemas.microsoft.com/office/drawing/2014/main" id="{A3BE565D-7603-4549-8FE5-0AFCCBABFF99}"/>
-              </a:ext>
-            </a:extLst>
-          </p:cNvPr>
-          <p:cNvPicPr>
-            <a:picLocks noChangeAspect="1" noChangeArrowheads="1"/>
-          </p:cNvPicPr>
-          <p:nvPr/>
-        </p:nvPicPr>
-        <p:blipFill>
-          <a:blip r:embed="rId2">
-            <a:extLst>
-              <a:ext uri="{28A0092B-C50C-407E-A947-70E740481C1C}">
-                <a14:useLocalDpi xmlns:a14="http://schemas.microsoft.com/office/drawing/2010/main" val="0"/>
-              </a:ext>
-            </a:extLst>
-          </a:blip>
-          <a:srcRect/>
-          <a:stretch>
-            <a:fillRect/>
-          </a:stretch>
-        </p:blipFill>
-        <p:spPr bwMode="auto">
-          <a:xfrm>
-            <a:off x="6896599" y="4693227"/>
-            <a:ext cx="5175427" cy="1996371"/>
-          </a:xfrm>
-          <a:prstGeom prst="rect">
-            <a:avLst/>
-          </a:prstGeom>
-          <a:noFill/>
-          <a:extLst>
-            <a:ext uri="{909E8E84-426E-40DD-AFC4-6F175D3DCCD1}">
-              <a14:hiddenFill xmlns:a14="http://schemas.microsoft.com/office/drawing/2010/main">
-                <a:solidFill>
-                  <a:srgbClr val="FFFFFF"/>
-                </a:solidFill>
-              </a14:hiddenFill>
-            </a:ext>
-          </a:extLst>
-        </p:spPr>
-      </p:pic>
-      <p:pic>
-        <p:nvPicPr>
-          <p:cNvPr id="1030" name="Picture 6">
-            <a:extLst>
-              <a:ext uri="{FF2B5EF4-FFF2-40B4-BE49-F238E27FC236}">
-                <a16:creationId xmlns:a16="http://schemas.microsoft.com/office/drawing/2014/main" id="{E645FC99-52AA-4EAF-A8CD-A7D10E9A3C4E}"/>
-              </a:ext>
-            </a:extLst>
-          </p:cNvPr>
-          <p:cNvPicPr>
-            <a:picLocks noChangeAspect="1" noChangeArrowheads="1"/>
-          </p:cNvPicPr>
-          <p:nvPr/>
-        </p:nvPicPr>
-        <p:blipFill>
-          <a:blip r:embed="rId3">
-            <a:extLst>
-              <a:ext uri="{28A0092B-C50C-407E-A947-70E740481C1C}">
-                <a14:useLocalDpi xmlns:a14="http://schemas.microsoft.com/office/drawing/2010/main" val="0"/>
-              </a:ext>
-            </a:extLst>
-          </a:blip>
-          <a:srcRect/>
-          <a:stretch>
-            <a:fillRect/>
-          </a:stretch>
-        </p:blipFill>
-        <p:spPr bwMode="auto">
-          <a:xfrm>
-            <a:off x="161366" y="209336"/>
-            <a:ext cx="3193992" cy="651275"/>
-          </a:xfrm>
-          <a:prstGeom prst="rect">
-            <a:avLst/>
-          </a:prstGeom>
-          <a:noFill/>
-          <a:extLst>
-            <a:ext uri="{909E8E84-426E-40DD-AFC4-6F175D3DCCD1}">
-              <a14:hiddenFill xmlns:a14="http://schemas.microsoft.com/office/drawing/2010/main">
-                <a:solidFill>
-                  <a:srgbClr val="FFFFFF"/>
-                </a:solidFill>
-              </a14:hiddenFill>
-            </a:ext>
-          </a:extLst>
-        </p:spPr>
-      </p:pic>
+          <a:p>
+            <a:r>
+              <a:rPr lang="en-US" dirty="0"/>
+              <a:t>Acts as a middle layer between Spark runtime and cloud storage</a:t>
+            </a:r>
+          </a:p>
+        </p:txBody>
+      </p:sp>
     </p:spTree>
     <p:extLst>
       <p:ext uri="{BB962C8B-B14F-4D97-AF65-F5344CB8AC3E}">
-        <p14:creationId xmlns:p14="http://schemas.microsoft.com/office/powerpoint/2010/main" val="1075040977"/>
+        <p14:creationId xmlns:p14="http://schemas.microsoft.com/office/powerpoint/2010/main" val="2250654023"/>
       </p:ext>
     </p:extLst>
   </p:cSld>
@@ -7795,7 +7767,7 @@
           <p:cNvPr id="2" name="Title 1">
             <a:extLst>
               <a:ext uri="{FF2B5EF4-FFF2-40B4-BE49-F238E27FC236}">
-                <a16:creationId xmlns:a16="http://schemas.microsoft.com/office/drawing/2014/main" id="{212FCCA5-0889-4FED-AB17-133D962090A7}"/>
+                <a16:creationId xmlns:a16="http://schemas.microsoft.com/office/drawing/2014/main" id="{7C9DCB3F-F6DA-4EDE-817D-87E7D2C208A7}"/>
               </a:ext>
             </a:extLst>
           </p:cNvPr>
@@ -7813,7 +7785,7 @@
           <a:p>
             <a:r>
               <a:rPr lang="en-US" dirty="0"/>
-              <a:t>Delta Lake Key Features</a:t>
+              <a:t>Apache Parquet Files</a:t>
             </a:r>
           </a:p>
         </p:txBody>
@@ -7823,7 +7795,7 @@
           <p:cNvPr id="3" name="Content Placeholder 2">
             <a:extLst>
               <a:ext uri="{FF2B5EF4-FFF2-40B4-BE49-F238E27FC236}">
-                <a16:creationId xmlns:a16="http://schemas.microsoft.com/office/drawing/2014/main" id="{E6E18568-39DF-498B-9500-6C64B1381B79}"/>
+                <a16:creationId xmlns:a16="http://schemas.microsoft.com/office/drawing/2014/main" id="{F805BB87-94E0-436B-A872-466AA062ECC5}"/>
               </a:ext>
             </a:extLst>
           </p:cNvPr>
@@ -7841,55 +7813,137 @@
           <a:p>
             <a:r>
               <a:rPr lang="en-US" dirty="0"/>
-              <a:t>ACID Transactions (Atomicity, Consistency, Isolation, Durability)</a:t>
-            </a:r>
-          </a:p>
-          <a:p>
-            <a:r>
-              <a:rPr lang="en-US" dirty="0"/>
-              <a:t>Scalable Metadata Handling</a:t>
-            </a:r>
-          </a:p>
-          <a:p>
-            <a:r>
-              <a:rPr lang="en-US" dirty="0"/>
-              <a:t>Unified Batch &amp; Streaming</a:t>
-            </a:r>
-          </a:p>
-          <a:p>
-            <a:r>
-              <a:rPr lang="en-US" dirty="0"/>
-              <a:t>Schema Enforcement</a:t>
-            </a:r>
-          </a:p>
-          <a:p>
-            <a:r>
-              <a:rPr lang="en-US" dirty="0"/>
-              <a:t>Time Travel (Data Versioning)</a:t>
-            </a:r>
-          </a:p>
-          <a:p>
-            <a:r>
-              <a:rPr lang="en-US" dirty="0" err="1"/>
-              <a:t>Upserts</a:t>
-            </a:r>
-            <a:r>
-              <a:rPr lang="en-US" dirty="0"/>
-              <a:t> and Deletes</a:t>
-            </a:r>
-          </a:p>
-          <a:p>
-            <a:r>
-              <a:rPr lang="en-US" dirty="0"/>
-              <a:t>100% Compatible with Apache Spark</a:t>
-            </a:r>
-          </a:p>
-        </p:txBody>
-      </p:sp>
+              <a:t>Columnar storage</a:t>
+            </a:r>
+          </a:p>
+          <a:p>
+            <a:pPr lvl="1"/>
+            <a:r>
+              <a:rPr lang="en-US" dirty="0"/>
+              <a:t>As apposed to row-based files like CSV or Avro</a:t>
+            </a:r>
+          </a:p>
+          <a:p>
+            <a:r>
+              <a:rPr lang="en-US" dirty="0"/>
+              <a:t>Metadata including schema and structure is embedded within each file</a:t>
+            </a:r>
+          </a:p>
+          <a:p>
+            <a:r>
+              <a:rPr lang="en-US" dirty="0"/>
+              <a:t>Can store nested data</a:t>
+            </a:r>
+          </a:p>
+          <a:p>
+            <a:r>
+              <a:rPr lang="en-US" dirty="0"/>
+              <a:t>Optimized for queries that process large volumes of data (Gb range)</a:t>
+            </a:r>
+          </a:p>
+          <a:p>
+            <a:endParaRPr lang="en-US" dirty="0"/>
+          </a:p>
+        </p:txBody>
+      </p:sp>
+      <p:pic>
+        <p:nvPicPr>
+          <p:cNvPr id="1026" name="Picture 2">
+            <a:extLst>
+              <a:ext uri="{FF2B5EF4-FFF2-40B4-BE49-F238E27FC236}">
+                <a16:creationId xmlns:a16="http://schemas.microsoft.com/office/drawing/2014/main" id="{A3BE565D-7603-4549-8FE5-0AFCCBABFF99}"/>
+              </a:ext>
+            </a:extLst>
+          </p:cNvPr>
+          <p:cNvPicPr>
+            <a:picLocks noChangeAspect="1" noChangeArrowheads="1"/>
+          </p:cNvPicPr>
+          <p:nvPr/>
+        </p:nvPicPr>
+        <p:blipFill>
+          <a:blip r:embed="rId2">
+            <a:extLst>
+              <a:ext uri="{28A0092B-C50C-407E-A947-70E740481C1C}">
+                <a14:useLocalDpi xmlns:a14="http://schemas.microsoft.com/office/drawing/2010/main" val="0"/>
+              </a:ext>
+            </a:extLst>
+          </a:blip>
+          <a:srcRect/>
+          <a:stretch>
+            <a:fillRect/>
+          </a:stretch>
+        </p:blipFill>
+        <p:spPr bwMode="auto">
+          <a:xfrm>
+            <a:off x="6896599" y="4693227"/>
+            <a:ext cx="5175427" cy="1996371"/>
+          </a:xfrm>
+          <a:prstGeom prst="rect">
+            <a:avLst/>
+          </a:prstGeom>
+          <a:noFill/>
+          <a:extLst>
+            <a:ext uri="{909E8E84-426E-40DD-AFC4-6F175D3DCCD1}">
+              <a14:hiddenFill xmlns:a14="http://schemas.microsoft.com/office/drawing/2010/main">
+                <a:solidFill>
+                  <a:srgbClr val="FFFFFF"/>
+                </a:solidFill>
+              </a14:hiddenFill>
+            </a:ext>
+          </a:extLst>
+        </p:spPr>
+      </p:pic>
+      <p:pic>
+        <p:nvPicPr>
+          <p:cNvPr id="1030" name="Picture 6">
+            <a:extLst>
+              <a:ext uri="{FF2B5EF4-FFF2-40B4-BE49-F238E27FC236}">
+                <a16:creationId xmlns:a16="http://schemas.microsoft.com/office/drawing/2014/main" id="{E645FC99-52AA-4EAF-A8CD-A7D10E9A3C4E}"/>
+              </a:ext>
+            </a:extLst>
+          </p:cNvPr>
+          <p:cNvPicPr>
+            <a:picLocks noChangeAspect="1" noChangeArrowheads="1"/>
+          </p:cNvPicPr>
+          <p:nvPr/>
+        </p:nvPicPr>
+        <p:blipFill>
+          <a:blip r:embed="rId3">
+            <a:extLst>
+              <a:ext uri="{28A0092B-C50C-407E-A947-70E740481C1C}">
+                <a14:useLocalDpi xmlns:a14="http://schemas.microsoft.com/office/drawing/2010/main" val="0"/>
+              </a:ext>
+            </a:extLst>
+          </a:blip>
+          <a:srcRect/>
+          <a:stretch>
+            <a:fillRect/>
+          </a:stretch>
+        </p:blipFill>
+        <p:spPr bwMode="auto">
+          <a:xfrm>
+            <a:off x="161366" y="209336"/>
+            <a:ext cx="3193992" cy="651275"/>
+          </a:xfrm>
+          <a:prstGeom prst="rect">
+            <a:avLst/>
+          </a:prstGeom>
+          <a:noFill/>
+          <a:extLst>
+            <a:ext uri="{909E8E84-426E-40DD-AFC4-6F175D3DCCD1}">
+              <a14:hiddenFill xmlns:a14="http://schemas.microsoft.com/office/drawing/2010/main">
+                <a:solidFill>
+                  <a:srgbClr val="FFFFFF"/>
+                </a:solidFill>
+              </a14:hiddenFill>
+            </a:ext>
+          </a:extLst>
+        </p:spPr>
+      </p:pic>
     </p:spTree>
     <p:extLst>
       <p:ext uri="{BB962C8B-B14F-4D97-AF65-F5344CB8AC3E}">
-        <p14:creationId xmlns:p14="http://schemas.microsoft.com/office/powerpoint/2010/main" val="934027769"/>
+        <p14:creationId xmlns:p14="http://schemas.microsoft.com/office/powerpoint/2010/main" val="1075040977"/>
       </p:ext>
     </p:extLst>
   </p:cSld>
@@ -7921,7 +7975,7 @@
           <p:cNvPr id="2" name="Title 1">
             <a:extLst>
               <a:ext uri="{FF2B5EF4-FFF2-40B4-BE49-F238E27FC236}">
-                <a16:creationId xmlns:a16="http://schemas.microsoft.com/office/drawing/2014/main" id="{138F27C4-334B-4680-830A-59353C9C202C}"/>
+                <a16:creationId xmlns:a16="http://schemas.microsoft.com/office/drawing/2014/main" id="{212FCCA5-0889-4FED-AB17-133D962090A7}"/>
               </a:ext>
             </a:extLst>
           </p:cNvPr>
@@ -7939,7 +7993,7 @@
           <a:p>
             <a:r>
               <a:rPr lang="en-US" dirty="0"/>
-              <a:t>Delta Table</a:t>
+              <a:t>Delta Lake Key Features</a:t>
             </a:r>
           </a:p>
         </p:txBody>
@@ -7949,7 +8003,7 @@
           <p:cNvPr id="3" name="Content Placeholder 2">
             <a:extLst>
               <a:ext uri="{FF2B5EF4-FFF2-40B4-BE49-F238E27FC236}">
-                <a16:creationId xmlns:a16="http://schemas.microsoft.com/office/drawing/2014/main" id="{03E96EF4-C289-4A9B-84B1-7492856596E4}"/>
+                <a16:creationId xmlns:a16="http://schemas.microsoft.com/office/drawing/2014/main" id="{E6E18568-39DF-498B-9500-6C64B1381B79}"/>
               </a:ext>
             </a:extLst>
           </p:cNvPr>
@@ -7967,105 +8021,55 @@
           <a:p>
             <a:r>
               <a:rPr lang="en-US" dirty="0"/>
-              <a:t>Virtual tables on top of your delta lake folders</a:t>
-            </a:r>
-          </a:p>
-        </p:txBody>
-      </p:sp>
-      <p:pic>
-        <p:nvPicPr>
-          <p:cNvPr id="5" name="Picture 4">
-            <a:extLst>
-              <a:ext uri="{FF2B5EF4-FFF2-40B4-BE49-F238E27FC236}">
-                <a16:creationId xmlns:a16="http://schemas.microsoft.com/office/drawing/2014/main" id="{F74065F3-817E-4236-A7B6-47DB03DA1CDD}"/>
-              </a:ext>
-            </a:extLst>
-          </p:cNvPr>
-          <p:cNvPicPr>
-            <a:picLocks noChangeAspect="1"/>
-          </p:cNvPicPr>
-          <p:nvPr/>
-        </p:nvPicPr>
-        <p:blipFill>
-          <a:blip r:embed="rId2"/>
-          <a:stretch>
-            <a:fillRect/>
-          </a:stretch>
-        </p:blipFill>
-        <p:spPr>
-          <a:xfrm>
-            <a:off x="130554" y="2682240"/>
-            <a:ext cx="1312611" cy="4021837"/>
-          </a:xfrm>
-          <a:prstGeom prst="rect">
-            <a:avLst/>
-          </a:prstGeom>
-        </p:spPr>
-      </p:pic>
-      <p:pic>
-        <p:nvPicPr>
-          <p:cNvPr id="7" name="Picture 6">
-            <a:extLst>
-              <a:ext uri="{FF2B5EF4-FFF2-40B4-BE49-F238E27FC236}">
-                <a16:creationId xmlns:a16="http://schemas.microsoft.com/office/drawing/2014/main" id="{DAAEE9DA-D50E-4976-89ED-214E6B317659}"/>
-              </a:ext>
-            </a:extLst>
-          </p:cNvPr>
-          <p:cNvPicPr>
-            <a:picLocks noChangeAspect="1"/>
-          </p:cNvPicPr>
-          <p:nvPr/>
-        </p:nvPicPr>
-        <p:blipFill>
-          <a:blip r:embed="rId3"/>
-          <a:stretch>
-            <a:fillRect/>
-          </a:stretch>
-        </p:blipFill>
-        <p:spPr>
-          <a:xfrm>
-            <a:off x="5529071" y="3245607"/>
-            <a:ext cx="6384217" cy="2421290"/>
-          </a:xfrm>
-          <a:prstGeom prst="rect">
-            <a:avLst/>
-          </a:prstGeom>
-        </p:spPr>
-      </p:pic>
-      <p:pic>
-        <p:nvPicPr>
-          <p:cNvPr id="9" name="Picture 8">
-            <a:extLst>
-              <a:ext uri="{FF2B5EF4-FFF2-40B4-BE49-F238E27FC236}">
-                <a16:creationId xmlns:a16="http://schemas.microsoft.com/office/drawing/2014/main" id="{47B0EEDC-FD2E-4AF0-BD08-3DE19C3CA5EB}"/>
-              </a:ext>
-            </a:extLst>
-          </p:cNvPr>
-          <p:cNvPicPr>
-            <a:picLocks noChangeAspect="1"/>
-          </p:cNvPicPr>
-          <p:nvPr/>
-        </p:nvPicPr>
-        <p:blipFill>
-          <a:blip r:embed="rId4"/>
-          <a:stretch>
-            <a:fillRect/>
-          </a:stretch>
-        </p:blipFill>
-        <p:spPr>
-          <a:xfrm>
-            <a:off x="1699038" y="3245607"/>
-            <a:ext cx="3574159" cy="2411481"/>
-          </a:xfrm>
-          <a:prstGeom prst="rect">
-            <a:avLst/>
-          </a:prstGeom>
-        </p:spPr>
-      </p:pic>
+              <a:t>ACID Transactions (Atomicity, Consistency, Isolation, Durability)</a:t>
+            </a:r>
+          </a:p>
+          <a:p>
+            <a:r>
+              <a:rPr lang="en-US" dirty="0"/>
+              <a:t>Scalable Metadata Handling</a:t>
+            </a:r>
+          </a:p>
+          <a:p>
+            <a:r>
+              <a:rPr lang="en-US" dirty="0"/>
+              <a:t>Unified Batch &amp; Streaming</a:t>
+            </a:r>
+          </a:p>
+          <a:p>
+            <a:r>
+              <a:rPr lang="en-US" dirty="0"/>
+              <a:t>Schema Enforcement</a:t>
+            </a:r>
+          </a:p>
+          <a:p>
+            <a:r>
+              <a:rPr lang="en-US" dirty="0"/>
+              <a:t>Time Travel (Data Versioning)</a:t>
+            </a:r>
+          </a:p>
+          <a:p>
+            <a:r>
+              <a:rPr lang="en-US" dirty="0" err="1"/>
+              <a:t>Upserts</a:t>
+            </a:r>
+            <a:r>
+              <a:rPr lang="en-US" dirty="0"/>
+              <a:t> and Deletes</a:t>
+            </a:r>
+          </a:p>
+          <a:p>
+            <a:r>
+              <a:rPr lang="en-US" dirty="0"/>
+              <a:t>100% Compatible with Apache Spark</a:t>
+            </a:r>
+          </a:p>
+        </p:txBody>
+      </p:sp>
     </p:spTree>
     <p:extLst>
       <p:ext uri="{BB962C8B-B14F-4D97-AF65-F5344CB8AC3E}">
-        <p14:creationId xmlns:p14="http://schemas.microsoft.com/office/powerpoint/2010/main" val="1463387613"/>
+        <p14:creationId xmlns:p14="http://schemas.microsoft.com/office/powerpoint/2010/main" val="934027769"/>
       </p:ext>
     </p:extLst>
   </p:cSld>
@@ -8097,7 +8101,7 @@
           <p:cNvPr id="2" name="Title 1">
             <a:extLst>
               <a:ext uri="{FF2B5EF4-FFF2-40B4-BE49-F238E27FC236}">
-                <a16:creationId xmlns:a16="http://schemas.microsoft.com/office/drawing/2014/main" id="{E470AB4B-5FFE-4CD1-BA55-C81790335E06}"/>
+                <a16:creationId xmlns:a16="http://schemas.microsoft.com/office/drawing/2014/main" id="{138F27C4-334B-4680-830A-59353C9C202C}"/>
               </a:ext>
             </a:extLst>
           </p:cNvPr>
@@ -8115,62 +8119,133 @@
           <a:p>
             <a:r>
               <a:rPr lang="en-US" dirty="0"/>
-              <a:t>Medallion Model</a:t>
+              <a:t>Delta Table</a:t>
+            </a:r>
+          </a:p>
+        </p:txBody>
+      </p:sp>
+      <p:sp>
+        <p:nvSpPr>
+          <p:cNvPr id="3" name="Content Placeholder 2">
+            <a:extLst>
+              <a:ext uri="{FF2B5EF4-FFF2-40B4-BE49-F238E27FC236}">
+                <a16:creationId xmlns:a16="http://schemas.microsoft.com/office/drawing/2014/main" id="{03E96EF4-C289-4A9B-84B1-7492856596E4}"/>
+              </a:ext>
+            </a:extLst>
+          </p:cNvPr>
+          <p:cNvSpPr>
+            <a:spLocks noGrp="1"/>
+          </p:cNvSpPr>
+          <p:nvPr>
+            <p:ph idx="1"/>
+          </p:nvPr>
+        </p:nvSpPr>
+        <p:spPr/>
+        <p:txBody>
+          <a:bodyPr/>
+          <a:lstStyle/>
+          <a:p>
+            <a:r>
+              <a:rPr lang="en-US" dirty="0"/>
+              <a:t>Virtual tables on top of your delta lake folders</a:t>
             </a:r>
           </a:p>
         </p:txBody>
       </p:sp>
       <p:pic>
         <p:nvPicPr>
-          <p:cNvPr id="1026" name="Picture 2" descr="How to Monitor Your Databricks Workspace with Audit Logs - The Databricks  Blog">
+          <p:cNvPr id="5" name="Picture 4">
             <a:extLst>
               <a:ext uri="{FF2B5EF4-FFF2-40B4-BE49-F238E27FC236}">
-                <a16:creationId xmlns:a16="http://schemas.microsoft.com/office/drawing/2014/main" id="{0C8A5809-F8C8-4BF6-B296-BE6F49018D22}"/>
+                <a16:creationId xmlns:a16="http://schemas.microsoft.com/office/drawing/2014/main" id="{F74065F3-817E-4236-A7B6-47DB03DA1CDD}"/>
               </a:ext>
             </a:extLst>
           </p:cNvPr>
           <p:cNvPicPr>
-            <a:picLocks noChangeAspect="1" noChangeArrowheads="1"/>
+            <a:picLocks noChangeAspect="1"/>
           </p:cNvPicPr>
           <p:nvPr/>
         </p:nvPicPr>
         <p:blipFill>
-          <a:blip r:embed="rId2">
-            <a:extLst>
-              <a:ext uri="{28A0092B-C50C-407E-A947-70E740481C1C}">
-                <a14:useLocalDpi xmlns:a14="http://schemas.microsoft.com/office/drawing/2010/main" val="0"/>
-              </a:ext>
-            </a:extLst>
-          </a:blip>
-          <a:srcRect/>
+          <a:blip r:embed="rId2"/>
           <a:stretch>
             <a:fillRect/>
           </a:stretch>
         </p:blipFill>
-        <p:spPr bwMode="auto">
-          <a:xfrm>
-            <a:off x="1559438" y="1665479"/>
-            <a:ext cx="9062476" cy="4757800"/>
+        <p:spPr>
+          <a:xfrm>
+            <a:off x="130554" y="2682240"/>
+            <a:ext cx="1312611" cy="4021837"/>
           </a:xfrm>
           <a:prstGeom prst="rect">
             <a:avLst/>
           </a:prstGeom>
-          <a:noFill/>
-          <a:extLst>
-            <a:ext uri="{909E8E84-426E-40DD-AFC4-6F175D3DCCD1}">
-              <a14:hiddenFill xmlns:a14="http://schemas.microsoft.com/office/drawing/2010/main">
-                <a:solidFill>
-                  <a:srgbClr val="FFFFFF"/>
-                </a:solidFill>
-              </a14:hiddenFill>
-            </a:ext>
-          </a:extLst>
+        </p:spPr>
+      </p:pic>
+      <p:pic>
+        <p:nvPicPr>
+          <p:cNvPr id="7" name="Picture 6">
+            <a:extLst>
+              <a:ext uri="{FF2B5EF4-FFF2-40B4-BE49-F238E27FC236}">
+                <a16:creationId xmlns:a16="http://schemas.microsoft.com/office/drawing/2014/main" id="{DAAEE9DA-D50E-4976-89ED-214E6B317659}"/>
+              </a:ext>
+            </a:extLst>
+          </p:cNvPr>
+          <p:cNvPicPr>
+            <a:picLocks noChangeAspect="1"/>
+          </p:cNvPicPr>
+          <p:nvPr/>
+        </p:nvPicPr>
+        <p:blipFill>
+          <a:blip r:embed="rId3"/>
+          <a:stretch>
+            <a:fillRect/>
+          </a:stretch>
+        </p:blipFill>
+        <p:spPr>
+          <a:xfrm>
+            <a:off x="5529071" y="3245607"/>
+            <a:ext cx="6384217" cy="2421290"/>
+          </a:xfrm>
+          <a:prstGeom prst="rect">
+            <a:avLst/>
+          </a:prstGeom>
+        </p:spPr>
+      </p:pic>
+      <p:pic>
+        <p:nvPicPr>
+          <p:cNvPr id="9" name="Picture 8">
+            <a:extLst>
+              <a:ext uri="{FF2B5EF4-FFF2-40B4-BE49-F238E27FC236}">
+                <a16:creationId xmlns:a16="http://schemas.microsoft.com/office/drawing/2014/main" id="{47B0EEDC-FD2E-4AF0-BD08-3DE19C3CA5EB}"/>
+              </a:ext>
+            </a:extLst>
+          </p:cNvPr>
+          <p:cNvPicPr>
+            <a:picLocks noChangeAspect="1"/>
+          </p:cNvPicPr>
+          <p:nvPr/>
+        </p:nvPicPr>
+        <p:blipFill>
+          <a:blip r:embed="rId4"/>
+          <a:stretch>
+            <a:fillRect/>
+          </a:stretch>
+        </p:blipFill>
+        <p:spPr>
+          <a:xfrm>
+            <a:off x="1699038" y="3245607"/>
+            <a:ext cx="3574159" cy="2411481"/>
+          </a:xfrm>
+          <a:prstGeom prst="rect">
+            <a:avLst/>
+          </a:prstGeom>
         </p:spPr>
       </p:pic>
     </p:spTree>
     <p:extLst>
       <p:ext uri="{BB962C8B-B14F-4D97-AF65-F5344CB8AC3E}">
-        <p14:creationId xmlns:p14="http://schemas.microsoft.com/office/powerpoint/2010/main" val="2006484722"/>
+        <p14:creationId xmlns:p14="http://schemas.microsoft.com/office/powerpoint/2010/main" val="1463387613"/>
       </p:ext>
     </p:extLst>
   </p:cSld>
@@ -8202,6 +8277,111 @@
           <p:cNvPr id="2" name="Title 1">
             <a:extLst>
               <a:ext uri="{FF2B5EF4-FFF2-40B4-BE49-F238E27FC236}">
+                <a16:creationId xmlns:a16="http://schemas.microsoft.com/office/drawing/2014/main" id="{E470AB4B-5FFE-4CD1-BA55-C81790335E06}"/>
+              </a:ext>
+            </a:extLst>
+          </p:cNvPr>
+          <p:cNvSpPr>
+            <a:spLocks noGrp="1"/>
+          </p:cNvSpPr>
+          <p:nvPr>
+            <p:ph type="title"/>
+          </p:nvPr>
+        </p:nvSpPr>
+        <p:spPr/>
+        <p:txBody>
+          <a:bodyPr/>
+          <a:lstStyle/>
+          <a:p>
+            <a:r>
+              <a:rPr lang="en-US" dirty="0"/>
+              <a:t>Medallion Model</a:t>
+            </a:r>
+          </a:p>
+        </p:txBody>
+      </p:sp>
+      <p:pic>
+        <p:nvPicPr>
+          <p:cNvPr id="1026" name="Picture 2" descr="How to Monitor Your Databricks Workspace with Audit Logs - The Databricks  Blog">
+            <a:extLst>
+              <a:ext uri="{FF2B5EF4-FFF2-40B4-BE49-F238E27FC236}">
+                <a16:creationId xmlns:a16="http://schemas.microsoft.com/office/drawing/2014/main" id="{0C8A5809-F8C8-4BF6-B296-BE6F49018D22}"/>
+              </a:ext>
+            </a:extLst>
+          </p:cNvPr>
+          <p:cNvPicPr>
+            <a:picLocks noChangeAspect="1" noChangeArrowheads="1"/>
+          </p:cNvPicPr>
+          <p:nvPr/>
+        </p:nvPicPr>
+        <p:blipFill>
+          <a:blip r:embed="rId2">
+            <a:extLst>
+              <a:ext uri="{28A0092B-C50C-407E-A947-70E740481C1C}">
+                <a14:useLocalDpi xmlns:a14="http://schemas.microsoft.com/office/drawing/2010/main" val="0"/>
+              </a:ext>
+            </a:extLst>
+          </a:blip>
+          <a:srcRect/>
+          <a:stretch>
+            <a:fillRect/>
+          </a:stretch>
+        </p:blipFill>
+        <p:spPr bwMode="auto">
+          <a:xfrm>
+            <a:off x="1559438" y="1665479"/>
+            <a:ext cx="9062476" cy="4757800"/>
+          </a:xfrm>
+          <a:prstGeom prst="rect">
+            <a:avLst/>
+          </a:prstGeom>
+          <a:noFill/>
+          <a:extLst>
+            <a:ext uri="{909E8E84-426E-40DD-AFC4-6F175D3DCCD1}">
+              <a14:hiddenFill xmlns:a14="http://schemas.microsoft.com/office/drawing/2010/main">
+                <a:solidFill>
+                  <a:srgbClr val="FFFFFF"/>
+                </a:solidFill>
+              </a14:hiddenFill>
+            </a:ext>
+          </a:extLst>
+        </p:spPr>
+      </p:pic>
+    </p:spTree>
+    <p:extLst>
+      <p:ext uri="{BB962C8B-B14F-4D97-AF65-F5344CB8AC3E}">
+        <p14:creationId xmlns:p14="http://schemas.microsoft.com/office/powerpoint/2010/main" val="2006484722"/>
+      </p:ext>
+    </p:extLst>
+  </p:cSld>
+  <p:clrMapOvr>
+    <a:masterClrMapping/>
+  </p:clrMapOvr>
+</p:sld>
+</file>
+
+<file path=ppt/slides/slide24.xml><?xml version="1.0" encoding="utf-8"?>
+<p:sld xmlns:a="http://schemas.openxmlformats.org/drawingml/2006/main" xmlns:r="http://schemas.openxmlformats.org/officeDocument/2006/relationships" xmlns:p="http://schemas.openxmlformats.org/presentationml/2006/main">
+  <p:cSld>
+    <p:spTree>
+      <p:nvGrpSpPr>
+        <p:cNvPr id="1" name=""/>
+        <p:cNvGrpSpPr/>
+        <p:nvPr/>
+      </p:nvGrpSpPr>
+      <p:grpSpPr>
+        <a:xfrm>
+          <a:off x="0" y="0"/>
+          <a:ext cx="0" cy="0"/>
+          <a:chOff x="0" y="0"/>
+          <a:chExt cx="0" cy="0"/>
+        </a:xfrm>
+      </p:grpSpPr>
+      <p:sp>
+        <p:nvSpPr>
+          <p:cNvPr id="2" name="Title 1">
+            <a:extLst>
+              <a:ext uri="{FF2B5EF4-FFF2-40B4-BE49-F238E27FC236}">
                 <a16:creationId xmlns:a16="http://schemas.microsoft.com/office/drawing/2014/main" id="{2F2E1B50-6832-4A24-BFAD-F8C01A644AA4}"/>
               </a:ext>
             </a:extLst>
@@ -8265,6 +8445,189 @@
     <p:extLst>
       <p:ext uri="{BB962C8B-B14F-4D97-AF65-F5344CB8AC3E}">
         <p14:creationId xmlns:p14="http://schemas.microsoft.com/office/powerpoint/2010/main" val="1958179182"/>
+      </p:ext>
+    </p:extLst>
+  </p:cSld>
+  <p:clrMapOvr>
+    <a:masterClrMapping/>
+  </p:clrMapOvr>
+</p:sld>
+</file>
+
+<file path=ppt/slides/slide25.xml><?xml version="1.0" encoding="utf-8"?>
+<p:sld xmlns:a="http://schemas.openxmlformats.org/drawingml/2006/main" xmlns:r="http://schemas.openxmlformats.org/officeDocument/2006/relationships" xmlns:p="http://schemas.openxmlformats.org/presentationml/2006/main">
+  <p:cSld>
+    <p:spTree>
+      <p:nvGrpSpPr>
+        <p:cNvPr id="1" name=""/>
+        <p:cNvGrpSpPr/>
+        <p:nvPr/>
+      </p:nvGrpSpPr>
+      <p:grpSpPr>
+        <a:xfrm>
+          <a:off x="0" y="0"/>
+          <a:ext cx="0" cy="0"/>
+          <a:chOff x="0" y="0"/>
+          <a:chExt cx="0" cy="0"/>
+        </a:xfrm>
+      </p:grpSpPr>
+      <p:sp>
+        <p:nvSpPr>
+          <p:cNvPr id="2" name="Title 1">
+            <a:extLst>
+              <a:ext uri="{FF2B5EF4-FFF2-40B4-BE49-F238E27FC236}">
+                <a16:creationId xmlns:a16="http://schemas.microsoft.com/office/drawing/2014/main" id="{FEA7D021-205E-4D02-BC7A-B59B3E3B431C}"/>
+              </a:ext>
+            </a:extLst>
+          </p:cNvPr>
+          <p:cNvSpPr>
+            <a:spLocks noGrp="1"/>
+          </p:cNvSpPr>
+          <p:nvPr>
+            <p:ph type="title"/>
+          </p:nvPr>
+        </p:nvSpPr>
+        <p:spPr/>
+        <p:txBody>
+          <a:bodyPr/>
+          <a:lstStyle/>
+          <a:p>
+            <a:r>
+              <a:rPr lang="en-US" dirty="0"/>
+              <a:t>Tasks</a:t>
+            </a:r>
+          </a:p>
+        </p:txBody>
+      </p:sp>
+      <p:sp>
+        <p:nvSpPr>
+          <p:cNvPr id="3" name="Content Placeholder 2">
+            <a:extLst>
+              <a:ext uri="{FF2B5EF4-FFF2-40B4-BE49-F238E27FC236}">
+                <a16:creationId xmlns:a16="http://schemas.microsoft.com/office/drawing/2014/main" id="{126B2807-E3B5-419D-B369-EE657DDB6762}"/>
+              </a:ext>
+            </a:extLst>
+          </p:cNvPr>
+          <p:cNvSpPr>
+            <a:spLocks noGrp="1"/>
+          </p:cNvSpPr>
+          <p:nvPr>
+            <p:ph idx="1"/>
+          </p:nvPr>
+        </p:nvSpPr>
+        <p:spPr>
+          <a:xfrm>
+            <a:off x="913795" y="1613388"/>
+            <a:ext cx="10353762" cy="4941277"/>
+          </a:xfrm>
+        </p:spPr>
+        <p:txBody>
+          <a:bodyPr>
+            <a:normAutofit fontScale="92500" lnSpcReduction="10000"/>
+          </a:bodyPr>
+          <a:lstStyle/>
+          <a:p>
+            <a:r>
+              <a:rPr lang="en-US" dirty="0"/>
+              <a:t>Garden’s of trees</a:t>
+            </a:r>
+          </a:p>
+          <a:p>
+            <a:pPr lvl="1"/>
+            <a:r>
+              <a:rPr lang="en-US" dirty="0"/>
+              <a:t>Objective: </a:t>
+            </a:r>
+          </a:p>
+          <a:p>
+            <a:pPr lvl="2"/>
+            <a:r>
+              <a:rPr lang="en-US" dirty="0"/>
+              <a:t>read simple files</a:t>
+            </a:r>
+          </a:p>
+          <a:p>
+            <a:pPr lvl="2"/>
+            <a:r>
+              <a:rPr lang="en-US" dirty="0"/>
+              <a:t>Play around with </a:t>
+            </a:r>
+            <a:r>
+              <a:rPr lang="en-US" dirty="0" err="1"/>
+              <a:t>dataframes</a:t>
+            </a:r>
+            <a:endParaRPr lang="en-US" dirty="0"/>
+          </a:p>
+          <a:p>
+            <a:pPr lvl="2"/>
+            <a:r>
+              <a:rPr lang="en-US"/>
+              <a:t>Join operation</a:t>
+            </a:r>
+            <a:endParaRPr lang="en-US" dirty="0"/>
+          </a:p>
+          <a:p>
+            <a:pPr lvl="2"/>
+            <a:r>
+              <a:rPr lang="en-US" dirty="0"/>
+              <a:t>Aggregate and group by</a:t>
+            </a:r>
+          </a:p>
+          <a:p>
+            <a:pPr lvl="2"/>
+            <a:r>
+              <a:rPr lang="en-US" dirty="0"/>
+              <a:t>Min/max</a:t>
+            </a:r>
+          </a:p>
+          <a:p>
+            <a:r>
+              <a:rPr lang="en-US" dirty="0"/>
+              <a:t>User Medallion Model</a:t>
+            </a:r>
+          </a:p>
+          <a:p>
+            <a:pPr lvl="1"/>
+            <a:r>
+              <a:rPr lang="en-US" dirty="0"/>
+              <a:t>Objective:</a:t>
+            </a:r>
+          </a:p>
+          <a:p>
+            <a:pPr lvl="2"/>
+            <a:r>
+              <a:rPr lang="en-US" dirty="0"/>
+              <a:t>Read and write streams</a:t>
+            </a:r>
+          </a:p>
+          <a:p>
+            <a:pPr lvl="2"/>
+            <a:r>
+              <a:rPr lang="en-US" dirty="0"/>
+              <a:t>Create Delta tables</a:t>
+            </a:r>
+          </a:p>
+          <a:p>
+            <a:pPr lvl="2"/>
+            <a:r>
+              <a:rPr lang="en-US" dirty="0" err="1"/>
+              <a:t>Tranformations</a:t>
+            </a:r>
+            <a:endParaRPr lang="en-US" dirty="0"/>
+          </a:p>
+          <a:p>
+            <a:pPr lvl="2"/>
+            <a:endParaRPr lang="en-US" dirty="0"/>
+          </a:p>
+          <a:p>
+            <a:endParaRPr lang="en-US" dirty="0"/>
+          </a:p>
+        </p:txBody>
+      </p:sp>
+    </p:spTree>
+    <p:extLst>
+      <p:ext uri="{BB962C8B-B14F-4D97-AF65-F5344CB8AC3E}">
+        <p14:creationId xmlns:p14="http://schemas.microsoft.com/office/powerpoint/2010/main" val="1380298076"/>
       </p:ext>
     </p:extLst>
   </p:cSld>
@@ -9790,7 +10153,12 @@
             <p:ph idx="1"/>
           </p:nvPr>
         </p:nvSpPr>
-        <p:spPr/>
+        <p:spPr>
+          <a:xfrm>
+            <a:off x="913795" y="2076450"/>
+            <a:ext cx="10353762" cy="4522177"/>
+          </a:xfrm>
+        </p:spPr>
         <p:txBody>
           <a:bodyPr/>
           <a:lstStyle/>
@@ -9801,21 +10169,34 @@
             </a:r>
           </a:p>
           <a:p>
+            <a:pPr lvl="1"/>
+            <a:r>
+              <a:rPr lang="en-US" dirty="0"/>
+              <a:t>Bread and butter!</a:t>
+            </a:r>
+          </a:p>
+          <a:p>
+            <a:pPr lvl="1"/>
+            <a:endParaRPr lang="en-US" dirty="0"/>
+          </a:p>
+          <a:p>
+            <a:r>
+              <a:rPr lang="en-US" dirty="0"/>
+              <a:t>Commonly used in functional programming</a:t>
+            </a:r>
+          </a:p>
+          <a:p>
+            <a:pPr lvl="1"/>
             <a:r>
               <a:rPr lang="en-US" dirty="0"/>
               <a:t>Map procedure: filtering and sorting</a:t>
             </a:r>
           </a:p>
           <a:p>
+            <a:pPr lvl="1"/>
             <a:r>
               <a:rPr lang="en-US" dirty="0"/>
               <a:t>Reduce procedure: summary operation </a:t>
-            </a:r>
-          </a:p>
-          <a:p>
-            <a:r>
-              <a:rPr lang="en-US" dirty="0"/>
-              <a:t>commonly used in functional programming</a:t>
             </a:r>
           </a:p>
         </p:txBody>
@@ -10042,7 +10423,12 @@
             <p:ph idx="1"/>
           </p:nvPr>
         </p:nvSpPr>
-        <p:spPr/>
+        <p:spPr>
+          <a:xfrm>
+            <a:off x="913795" y="2076450"/>
+            <a:ext cx="10353762" cy="4447442"/>
+          </a:xfrm>
+        </p:spPr>
         <p:txBody>
           <a:bodyPr>
             <a:normAutofit lnSpcReduction="10000"/>
@@ -10061,9 +10447,19 @@
             </a:r>
           </a:p>
           <a:p>
-            <a:r>
-              <a:rPr lang="en-US" dirty="0"/>
-              <a:t>Borrowed from Hadoop Map‐ Reduce, but enhance</a:t>
+            <a:pPr marL="36900" indent="0">
+              <a:buNone/>
+            </a:pPr>
+            <a:endParaRPr lang="en-US" dirty="0"/>
+          </a:p>
+          <a:p>
+            <a:r>
+              <a:rPr lang="en-US" dirty="0"/>
+              <a:t>Borrowed from Hadoop Map‐ Reduce, </a:t>
+            </a:r>
+            <a:r>
+              <a:rPr lang="en-US" b="1" dirty="0"/>
+              <a:t>but enhance</a:t>
             </a:r>
           </a:p>
           <a:p>

</xml_diff>